<commit_message>
Added the exercise at the end of the InfoSec deck
</commit_message>
<xml_diff>
--- a/infosec.pptx
+++ b/infosec.pptx
@@ -35,6 +35,9 @@
     <p:sldId id="282" r:id="rId29"/>
     <p:sldId id="284" r:id="rId30"/>
     <p:sldId id="283" r:id="rId31"/>
+    <p:sldId id="290" r:id="rId32"/>
+    <p:sldId id="291" r:id="rId33"/>
+    <p:sldId id="292" r:id="rId34"/>
   </p:sldIdLst>
   <p:sldSz cx="9144000" cy="6858000" type="screen4x3"/>
   <p:notesSz cx="6858000" cy="9144000"/>
@@ -7076,6 +7079,448 @@
 </p:sld>
 </file>
 
+<file path=ppt/slides/slide31.xml><?xml version="1.0" encoding="utf-8"?>
+<p:sld xmlns:a="http://schemas.openxmlformats.org/drawingml/2006/main" xmlns:r="http://schemas.openxmlformats.org/officeDocument/2006/relationships" xmlns:p="http://schemas.openxmlformats.org/presentationml/2006/main">
+  <p:cSld>
+    <p:spTree>
+      <p:nvGrpSpPr>
+        <p:cNvPr id="1" name=""/>
+        <p:cNvGrpSpPr/>
+        <p:nvPr/>
+      </p:nvGrpSpPr>
+      <p:grpSpPr>
+        <a:xfrm>
+          <a:off x="0" y="0"/>
+          <a:ext cx="0" cy="0"/>
+          <a:chOff x="0" y="0"/>
+          <a:chExt cx="0" cy="0"/>
+        </a:xfrm>
+      </p:grpSpPr>
+      <p:sp>
+        <p:nvSpPr>
+          <p:cNvPr id="4" name="Title 3"/>
+          <p:cNvSpPr>
+            <a:spLocks noGrp="1"/>
+          </p:cNvSpPr>
+          <p:nvPr>
+            <p:ph type="title"/>
+          </p:nvPr>
+        </p:nvSpPr>
+        <p:spPr/>
+        <p:txBody>
+          <a:bodyPr/>
+          <a:lstStyle/>
+          <a:p>
+            <a:r>
+              <a:rPr lang="en-US" dirty="0"/>
+              <a:t>Research Project</a:t>
+            </a:r>
+          </a:p>
+        </p:txBody>
+      </p:sp>
+      <p:sp>
+        <p:nvSpPr>
+          <p:cNvPr id="5" name="Text Placeholder 4"/>
+          <p:cNvSpPr>
+            <a:spLocks noGrp="1"/>
+          </p:cNvSpPr>
+          <p:nvPr>
+            <p:ph type="body" idx="1"/>
+          </p:nvPr>
+        </p:nvSpPr>
+        <p:spPr/>
+        <p:txBody>
+          <a:bodyPr/>
+          <a:lstStyle/>
+          <a:p>
+            <a:endParaRPr lang="en-US"/>
+          </a:p>
+        </p:txBody>
+      </p:sp>
+    </p:spTree>
+    <p:extLst>
+      <p:ext uri="{BB962C8B-B14F-4D97-AF65-F5344CB8AC3E}">
+        <p14:creationId xmlns:p14="http://schemas.microsoft.com/office/powerpoint/2010/main" val="1494176875"/>
+      </p:ext>
+    </p:extLst>
+  </p:cSld>
+  <p:clrMapOvr>
+    <a:masterClrMapping/>
+  </p:clrMapOvr>
+</p:sld>
+</file>
+
+<file path=ppt/slides/slide32.xml><?xml version="1.0" encoding="utf-8"?>
+<p:sld xmlns:a="http://schemas.openxmlformats.org/drawingml/2006/main" xmlns:r="http://schemas.openxmlformats.org/officeDocument/2006/relationships" xmlns:p="http://schemas.openxmlformats.org/presentationml/2006/main">
+  <p:cSld>
+    <p:spTree>
+      <p:nvGrpSpPr>
+        <p:cNvPr id="1" name=""/>
+        <p:cNvGrpSpPr/>
+        <p:nvPr/>
+      </p:nvGrpSpPr>
+      <p:grpSpPr>
+        <a:xfrm>
+          <a:off x="0" y="0"/>
+          <a:ext cx="0" cy="0"/>
+          <a:chOff x="0" y="0"/>
+          <a:chExt cx="0" cy="0"/>
+        </a:xfrm>
+      </p:grpSpPr>
+      <p:sp>
+        <p:nvSpPr>
+          <p:cNvPr id="5" name="Content Placeholder 4"/>
+          <p:cNvSpPr>
+            <a:spLocks noGrp="1"/>
+          </p:cNvSpPr>
+          <p:nvPr>
+            <p:ph idx="1"/>
+          </p:nvPr>
+        </p:nvSpPr>
+        <p:spPr/>
+        <p:txBody>
+          <a:bodyPr>
+            <a:normAutofit/>
+          </a:bodyPr>
+          <a:lstStyle/>
+          <a:p>
+            <a:r>
+              <a:rPr lang="en-US" dirty="0"/>
+              <a:t>Research one computer security incident, create a short PowerPoint, and present it to the class</a:t>
+            </a:r>
+          </a:p>
+        </p:txBody>
+      </p:sp>
+      <p:sp>
+        <p:nvSpPr>
+          <p:cNvPr id="4" name="Title 3"/>
+          <p:cNvSpPr>
+            <a:spLocks noGrp="1"/>
+          </p:cNvSpPr>
+          <p:nvPr>
+            <p:ph type="title"/>
+          </p:nvPr>
+        </p:nvSpPr>
+        <p:spPr/>
+        <p:txBody>
+          <a:bodyPr/>
+          <a:lstStyle/>
+          <a:p>
+            <a:r>
+              <a:rPr lang="en-US" dirty="0"/>
+              <a:t>Learn About One Incident</a:t>
+            </a:r>
+          </a:p>
+        </p:txBody>
+      </p:sp>
+    </p:spTree>
+    <p:extLst>
+      <p:ext uri="{BB962C8B-B14F-4D97-AF65-F5344CB8AC3E}">
+        <p14:creationId xmlns:p14="http://schemas.microsoft.com/office/powerpoint/2010/main" val="1879445147"/>
+      </p:ext>
+    </p:extLst>
+  </p:cSld>
+  <p:clrMapOvr>
+    <a:masterClrMapping/>
+  </p:clrMapOvr>
+</p:sld>
+</file>
+
+<file path=ppt/slides/slide33.xml><?xml version="1.0" encoding="utf-8"?>
+<p:sld xmlns:a="http://schemas.openxmlformats.org/drawingml/2006/main" xmlns:r="http://schemas.openxmlformats.org/officeDocument/2006/relationships" xmlns:p="http://schemas.openxmlformats.org/presentationml/2006/main">
+  <p:cSld>
+    <p:spTree>
+      <p:nvGrpSpPr>
+        <p:cNvPr id="1" name=""/>
+        <p:cNvGrpSpPr/>
+        <p:nvPr/>
+      </p:nvGrpSpPr>
+      <p:grpSpPr>
+        <a:xfrm>
+          <a:off x="0" y="0"/>
+          <a:ext cx="0" cy="0"/>
+          <a:chOff x="0" y="0"/>
+          <a:chExt cx="0" cy="0"/>
+        </a:xfrm>
+      </p:grpSpPr>
+      <p:sp>
+        <p:nvSpPr>
+          <p:cNvPr id="2" name="Content Placeholder 1"/>
+          <p:cNvSpPr>
+            <a:spLocks noGrp="1"/>
+          </p:cNvSpPr>
+          <p:nvPr>
+            <p:ph sz="half" idx="1"/>
+          </p:nvPr>
+        </p:nvSpPr>
+        <p:spPr/>
+        <p:txBody>
+          <a:bodyPr>
+            <a:normAutofit lnSpcReduction="10000"/>
+          </a:bodyPr>
+          <a:lstStyle/>
+          <a:p>
+            <a:r>
+              <a:rPr lang="en-US" sz="2400" dirty="0"/>
+              <a:t>Sony Pictures Hack</a:t>
+            </a:r>
+          </a:p>
+          <a:p>
+            <a:pPr lvl="0" rtl="0" eaLnBrk="1" latinLnBrk="0" hangingPunct="1"/>
+            <a:r>
+              <a:rPr kumimoji="0" lang="en-US" sz="2400" kern="1200" dirty="0">
+                <a:effectLst/>
+                <a:ea typeface="+mj-ea"/>
+                <a:cs typeface="+mj-cs"/>
+              </a:rPr>
+              <a:t>Target Hack</a:t>
+            </a:r>
+          </a:p>
+          <a:p>
+            <a:pPr lvl="0" rtl="0" eaLnBrk="1" latinLnBrk="0" hangingPunct="1"/>
+            <a:r>
+              <a:rPr lang="en-US" sz="2400" dirty="0">
+                <a:ea typeface="+mj-ea"/>
+                <a:cs typeface="+mj-cs"/>
+              </a:rPr>
+              <a:t>Yahoo Hack</a:t>
+            </a:r>
+          </a:p>
+          <a:p>
+            <a:r>
+              <a:rPr lang="en-US" sz="2400" dirty="0"/>
+              <a:t>Ashley Madison Hack</a:t>
+            </a:r>
+          </a:p>
+          <a:p>
+            <a:r>
+              <a:rPr lang="en-US" sz="2400" dirty="0"/>
+              <a:t>Adobe Hack</a:t>
+            </a:r>
+          </a:p>
+          <a:p>
+            <a:r>
+              <a:rPr lang="en-US" sz="2400" dirty="0"/>
+              <a:t>JP Morgan Chase Hack</a:t>
+            </a:r>
+          </a:p>
+          <a:p>
+            <a:r>
+              <a:rPr lang="en-US" sz="2400" dirty="0"/>
+              <a:t>OPM Hack</a:t>
+            </a:r>
+          </a:p>
+          <a:p>
+            <a:r>
+              <a:rPr lang="en-US" sz="2400" dirty="0"/>
+              <a:t>Aramco Hack</a:t>
+            </a:r>
+          </a:p>
+          <a:p>
+            <a:pPr lvl="0" rtl="0" eaLnBrk="1" latinLnBrk="0" hangingPunct="1"/>
+            <a:r>
+              <a:rPr lang="en-US" sz="2400" dirty="0">
+                <a:ea typeface="+mj-ea"/>
+                <a:cs typeface="+mj-cs"/>
+              </a:rPr>
+              <a:t>List of Cyber Attacks</a:t>
+            </a:r>
+          </a:p>
+          <a:p>
+            <a:pPr lvl="0" rtl="0" eaLnBrk="1" latinLnBrk="0" hangingPunct="1"/>
+            <a:endParaRPr lang="en-US" sz="1600" dirty="0">
+              <a:solidFill>
+                <a:schemeClr val="tx2"/>
+              </a:solidFill>
+              <a:ea typeface="+mj-ea"/>
+              <a:cs typeface="+mj-cs"/>
+            </a:endParaRPr>
+          </a:p>
+          <a:p>
+            <a:pPr lvl="0" rtl="0" eaLnBrk="1" latinLnBrk="0" hangingPunct="1"/>
+            <a:endParaRPr lang="en-US" sz="1600" dirty="0">
+              <a:solidFill>
+                <a:schemeClr val="tx2"/>
+              </a:solidFill>
+              <a:ea typeface="+mj-ea"/>
+              <a:cs typeface="+mj-cs"/>
+            </a:endParaRPr>
+          </a:p>
+          <a:p>
+            <a:pPr lvl="0" rtl="0" eaLnBrk="1" latinLnBrk="0" hangingPunct="1"/>
+            <a:endParaRPr lang="en-US" dirty="0">
+              <a:effectLst/>
+            </a:endParaRPr>
+          </a:p>
+          <a:p>
+            <a:endParaRPr lang="en-US" dirty="0"/>
+          </a:p>
+        </p:txBody>
+      </p:sp>
+      <p:sp>
+        <p:nvSpPr>
+          <p:cNvPr id="4" name="Content Placeholder 3"/>
+          <p:cNvSpPr>
+            <a:spLocks noGrp="1"/>
+          </p:cNvSpPr>
+          <p:nvPr>
+            <p:ph sz="half" idx="2"/>
+          </p:nvPr>
+        </p:nvSpPr>
+        <p:spPr/>
+        <p:txBody>
+          <a:bodyPr>
+            <a:normAutofit lnSpcReduction="10000"/>
+          </a:bodyPr>
+          <a:lstStyle/>
+          <a:p>
+            <a:pPr lvl="0"/>
+            <a:r>
+              <a:rPr lang="en-US" sz="2400" dirty="0"/>
+              <a:t>Stuxnet</a:t>
+            </a:r>
+          </a:p>
+          <a:p>
+            <a:pPr lvl="0"/>
+            <a:r>
+              <a:rPr lang="en-US" sz="2400" dirty="0"/>
+              <a:t>Kevin </a:t>
+            </a:r>
+            <a:r>
+              <a:rPr lang="en-US" sz="2400" dirty="0" err="1"/>
+              <a:t>Mitnick</a:t>
+            </a:r>
+            <a:endParaRPr lang="en-US" sz="2400" dirty="0"/>
+          </a:p>
+          <a:p>
+            <a:pPr lvl="0"/>
+            <a:r>
+              <a:rPr lang="en-US" sz="2400" dirty="0"/>
+              <a:t>Edward Snowden</a:t>
+            </a:r>
+          </a:p>
+          <a:p>
+            <a:pPr lvl="0"/>
+            <a:r>
+              <a:rPr lang="en-US" sz="2400" dirty="0"/>
+              <a:t>Karim </a:t>
+            </a:r>
+            <a:r>
+              <a:rPr lang="en-US" sz="2400" dirty="0" err="1"/>
+              <a:t>Baratov</a:t>
+            </a:r>
+            <a:endParaRPr lang="en-US" sz="2400" dirty="0"/>
+          </a:p>
+          <a:p>
+            <a:pPr lvl="0"/>
+            <a:r>
+              <a:rPr lang="en-US" sz="2400" dirty="0"/>
+              <a:t>Anonymous</a:t>
+            </a:r>
+          </a:p>
+          <a:p>
+            <a:pPr lvl="0">
+              <a:buClr>
+                <a:srgbClr val="2DA2BF"/>
+              </a:buClr>
+            </a:pPr>
+            <a:r>
+              <a:rPr lang="en-US" sz="2400" dirty="0"/>
+              <a:t>Phishing</a:t>
+            </a:r>
+          </a:p>
+          <a:p>
+            <a:pPr lvl="0">
+              <a:buClr>
+                <a:srgbClr val="2DA2BF"/>
+              </a:buClr>
+            </a:pPr>
+            <a:r>
+              <a:rPr lang="en-US" sz="2400" dirty="0"/>
+              <a:t>Malicious URL</a:t>
+            </a:r>
+          </a:p>
+          <a:p>
+            <a:pPr lvl="0">
+              <a:buClr>
+                <a:srgbClr val="2DA2BF"/>
+              </a:buClr>
+            </a:pPr>
+            <a:r>
+              <a:rPr lang="en-US" sz="2400" dirty="0"/>
+              <a:t>OWASP Top 10</a:t>
+            </a:r>
+          </a:p>
+          <a:p>
+            <a:r>
+              <a:rPr lang="en-US" sz="2400" dirty="0"/>
+              <a:t>SQL Injection</a:t>
+            </a:r>
+          </a:p>
+          <a:p>
+            <a:r>
+              <a:rPr lang="en-US" sz="2400" dirty="0"/>
+              <a:t>Identity Theft</a:t>
+            </a:r>
+          </a:p>
+          <a:p>
+            <a:r>
+              <a:rPr lang="en-US" sz="2400" dirty="0"/>
+              <a:t>Ransomware</a:t>
+            </a:r>
+          </a:p>
+          <a:p>
+            <a:endParaRPr lang="en-US" sz="1600" dirty="0"/>
+          </a:p>
+        </p:txBody>
+      </p:sp>
+      <p:sp>
+        <p:nvSpPr>
+          <p:cNvPr id="3" name="Title 2"/>
+          <p:cNvSpPr>
+            <a:spLocks noGrp="1"/>
+          </p:cNvSpPr>
+          <p:nvPr>
+            <p:ph type="title"/>
+          </p:nvPr>
+        </p:nvSpPr>
+        <p:spPr/>
+        <p:txBody>
+          <a:bodyPr>
+            <a:normAutofit fontScale="90000"/>
+          </a:bodyPr>
+          <a:lstStyle/>
+          <a:p>
+            <a:pPr lvl="0" rtl="0" eaLnBrk="1" latinLnBrk="0" hangingPunct="1"/>
+            <a:r>
+              <a:rPr kumimoji="0" lang="en-US" sz="4100" b="1" kern="1200" dirty="0">
+                <a:solidFill>
+                  <a:schemeClr val="tx2"/>
+                </a:solidFill>
+                <a:effectLst/>
+                <a:latin typeface="+mj-lt"/>
+                <a:ea typeface="+mj-ea"/>
+                <a:cs typeface="+mj-cs"/>
+              </a:rPr>
+              <a:t>Here are some ideas for things to Google to get you started</a:t>
+            </a:r>
+            <a:endParaRPr lang="en-US" dirty="0"/>
+          </a:p>
+        </p:txBody>
+      </p:sp>
+    </p:spTree>
+    <p:extLst>
+      <p:ext uri="{BB962C8B-B14F-4D97-AF65-F5344CB8AC3E}">
+        <p14:creationId xmlns:p14="http://schemas.microsoft.com/office/powerpoint/2010/main" val="1596785772"/>
+      </p:ext>
+    </p:extLst>
+  </p:cSld>
+  <p:clrMapOvr>
+    <a:masterClrMapping/>
+  </p:clrMapOvr>
+</p:sld>
+</file>
+
 <file path=ppt/slides/slide4.xml><?xml version="1.0" encoding="utf-8"?>
 <p:sld xmlns:a="http://schemas.openxmlformats.org/drawingml/2006/main" xmlns:r="http://schemas.openxmlformats.org/officeDocument/2006/relationships" xmlns:p="http://schemas.openxmlformats.org/presentationml/2006/main">
   <p:cSld>

</xml_diff>